<commit_message>
update minium cover lession
</commit_message>
<xml_diff>
--- a/20277 Database systems/FunctionalDependencies_minimumCover.pptx
+++ b/20277 Database systems/FunctionalDependencies_minimumCover.pptx
@@ -121,6 +121,11 @@
       </a:defRPr>
     </a:lvl9pPr>
   </p:defaultTextStyle>
+  <p:extLst>
+    <p:ext uri="{EFAFB233-063F-42B5-8137-9DF3F51BA10A}">
+      <p15:sldGuideLst xmlns:p15="http://schemas.microsoft.com/office/powerpoint/2012/main"/>
+    </p:ext>
+  </p:extLst>
 </p:presentation>
 </file>
 
@@ -169,7 +174,6 @@
               <a:rPr lang="en-US"/>
               <a:t>Click to edit Master title style</a:t>
             </a:r>
-            <a:endParaRPr lang="en-US"/>
           </a:p>
         </p:txBody>
       </p:sp>
@@ -234,7 +238,6 @@
               <a:rPr lang="en-US"/>
               <a:t>Click to edit Master subtitle style</a:t>
             </a:r>
-            <a:endParaRPr lang="en-US"/>
           </a:p>
         </p:txBody>
       </p:sp>
@@ -352,7 +355,6 @@
               <a:rPr lang="en-US"/>
               <a:t>Click to edit Master title style</a:t>
             </a:r>
-            <a:endParaRPr lang="en-US"/>
           </a:p>
         </p:txBody>
       </p:sp>
@@ -404,7 +406,6 @@
               <a:rPr lang="en-US"/>
               <a:t>Fifth level</a:t>
             </a:r>
-            <a:endParaRPr lang="en-US"/>
           </a:p>
         </p:txBody>
       </p:sp>
@@ -527,7 +528,6 @@
               <a:rPr lang="en-US"/>
               <a:t>Click to edit Master title style</a:t>
             </a:r>
-            <a:endParaRPr lang="en-US"/>
           </a:p>
         </p:txBody>
       </p:sp>
@@ -584,7 +584,6 @@
               <a:rPr lang="en-US"/>
               <a:t>Fifth level</a:t>
             </a:r>
-            <a:endParaRPr lang="en-US"/>
           </a:p>
         </p:txBody>
       </p:sp>
@@ -702,7 +701,6 @@
               <a:rPr lang="en-US"/>
               <a:t>Click to edit Master title style</a:t>
             </a:r>
-            <a:endParaRPr lang="en-US"/>
           </a:p>
         </p:txBody>
       </p:sp>
@@ -754,7 +752,6 @@
               <a:rPr lang="en-US"/>
               <a:t>Fifth level</a:t>
             </a:r>
-            <a:endParaRPr lang="en-US"/>
           </a:p>
         </p:txBody>
       </p:sp>
@@ -881,7 +878,6 @@
               <a:rPr lang="en-US"/>
               <a:t>Click to edit Master title style</a:t>
             </a:r>
-            <a:endParaRPr lang="en-US"/>
           </a:p>
         </p:txBody>
       </p:sp>
@@ -1118,7 +1114,6 @@
               <a:rPr lang="en-US"/>
               <a:t>Click to edit Master title style</a:t>
             </a:r>
-            <a:endParaRPr lang="en-US"/>
           </a:p>
         </p:txBody>
       </p:sp>
@@ -1175,7 +1170,6 @@
               <a:rPr lang="en-US"/>
               <a:t>Fifth level</a:t>
             </a:r>
-            <a:endParaRPr lang="en-US"/>
           </a:p>
         </p:txBody>
       </p:sp>
@@ -1232,7 +1226,6 @@
               <a:rPr lang="en-US"/>
               <a:t>Fifth level</a:t>
             </a:r>
-            <a:endParaRPr lang="en-US"/>
           </a:p>
         </p:txBody>
       </p:sp>
@@ -1355,7 +1348,6 @@
               <a:rPr lang="en-US"/>
               <a:t>Click to edit Master title style</a:t>
             </a:r>
-            <a:endParaRPr lang="en-US"/>
           </a:p>
         </p:txBody>
       </p:sp>
@@ -1477,7 +1469,6 @@
               <a:rPr lang="en-US"/>
               <a:t>Fifth level</a:t>
             </a:r>
-            <a:endParaRPr lang="en-US"/>
           </a:p>
         </p:txBody>
       </p:sp>
@@ -1599,7 +1590,6 @@
               <a:rPr lang="en-US"/>
               <a:t>Fifth level</a:t>
             </a:r>
-            <a:endParaRPr lang="en-US"/>
           </a:p>
         </p:txBody>
       </p:sp>
@@ -1717,7 +1707,6 @@
               <a:rPr lang="en-US"/>
               <a:t>Click to edit Master title style</a:t>
             </a:r>
-            <a:endParaRPr lang="en-US"/>
           </a:p>
         </p:txBody>
       </p:sp>
@@ -1939,7 +1928,6 @@
               <a:rPr lang="en-US"/>
               <a:t>Click to edit Master title style</a:t>
             </a:r>
-            <a:endParaRPr lang="en-US"/>
           </a:p>
         </p:txBody>
       </p:sp>
@@ -2024,7 +2012,6 @@
               <a:rPr lang="en-US"/>
               <a:t>Fifth level</a:t>
             </a:r>
-            <a:endParaRPr lang="en-US"/>
           </a:p>
         </p:txBody>
       </p:sp>
@@ -2216,7 +2203,6 @@
               <a:rPr lang="en-US"/>
               <a:t>Click to edit Master title style</a:t>
             </a:r>
-            <a:endParaRPr lang="en-US"/>
           </a:p>
         </p:txBody>
       </p:sp>
@@ -2475,7 +2461,6 @@
               <a:rPr lang="en-US"/>
               <a:t>Click to edit Master title style</a:t>
             </a:r>
-            <a:endParaRPr lang="en-US"/>
           </a:p>
         </p:txBody>
       </p:sp>
@@ -2537,7 +2522,6 @@
               <a:rPr lang="en-US"/>
               <a:t>Fifth level</a:t>
             </a:r>
-            <a:endParaRPr lang="en-US"/>
           </a:p>
         </p:txBody>
       </p:sp>
@@ -2998,6 +2982,10 @@
           </a:bodyPr>
           <a:lstStyle/>
           <a:p>
+            <a:r>
+              <a:rPr lang="en-US" b="1" dirty="0"/>
+              <a:t/>
+            </a:r>
             <a:br>
               <a:rPr lang="en-US" b="1" dirty="0"/>
             </a:br>
@@ -3011,6 +2999,10 @@
             <a:r>
               <a:rPr lang="he-IL" b="1" dirty="0"/>
               <a:t>4 נקודות זכות ברמה רגילה</a:t>
+            </a:r>
+            <a:r>
+              <a:rPr lang="he-IL" dirty="0"/>
+              <a:t/>
             </a:r>
             <a:br>
               <a:rPr lang="he-IL" dirty="0"/>
@@ -3071,6 +3063,13 @@
   <p:clrMapOvr>
     <a:masterClrMapping/>
   </p:clrMapOvr>
+  <p:timing>
+    <p:tnLst>
+      <p:par>
+        <p:cTn id="1" dur="indefinite" restart="never" nodeType="tmRoot"/>
+      </p:par>
+    </p:tnLst>
+  </p:timing>
 </p:sld>
 </file>
 
@@ -3542,6 +3541,10 @@
               <a:rPr lang="en-US" dirty="0"/>
               <a:t>Attribute Closure</a:t>
             </a:r>
+            <a:r>
+              <a:rPr lang="en-US" sz="1800" dirty="0"/>
+              <a:t/>
+            </a:r>
             <a:br>
               <a:rPr lang="en-US" sz="1800" dirty="0"/>
             </a:br>
@@ -4049,6 +4052,10 @@
               <a:rPr lang="he-IL" dirty="0"/>
               <a:t>הסגור של איבר – דוגמה</a:t>
             </a:r>
+            <a:r>
+              <a:rPr lang="en-US" dirty="0"/>
+              <a:t/>
+            </a:r>
             <a:br>
               <a:rPr lang="en-US" dirty="0"/>
             </a:br>
@@ -4057,6 +4064,10 @@
                 <a:hlinkClick r:id="rId2"/>
               </a:rPr>
               <a:t>https://www.youtube.com/watch?v=IUPTC65B9qE</a:t>
+            </a:r>
+            <a:r>
+              <a:rPr lang="he-IL" sz="1800" dirty="0"/>
+              <a:t/>
             </a:r>
             <a:br>
               <a:rPr lang="he-IL" sz="1800" dirty="0"/>
@@ -4242,6 +4253,10 @@
               <a:rPr lang="he-IL" sz="3200" dirty="0"/>
               <a:t>הסגור של איבר – דוגמה </a:t>
             </a:r>
+            <a:r>
+              <a:rPr lang="en-US" sz="3200" dirty="0"/>
+              <a:t/>
+            </a:r>
             <a:br>
               <a:rPr lang="en-US" sz="3200" dirty="0"/>
             </a:br>
@@ -4766,31 +4781,7 @@
           <a:p>
             <a:r>
               <a:rPr lang="en-US" dirty="0"/>
-              <a:t>A. </a:t>
-            </a:r>
-            <a:r>
-              <a:rPr lang="en-US" dirty="0" err="1"/>
-              <a:t>Silberschatz</a:t>
-            </a:r>
-            <a:r>
-              <a:rPr lang="en-US" dirty="0"/>
-              <a:t>, H.F. </a:t>
-            </a:r>
-            <a:r>
-              <a:rPr lang="en-US" dirty="0" err="1"/>
-              <a:t>Korth</a:t>
-            </a:r>
-            <a:r>
-              <a:rPr lang="en-US" dirty="0"/>
-              <a:t> &amp; S. </a:t>
-            </a:r>
-            <a:r>
-              <a:rPr lang="en-US" dirty="0" err="1"/>
-              <a:t>Sudarshan</a:t>
-            </a:r>
-            <a:r>
-              <a:rPr lang="en-US" dirty="0"/>
-              <a:t>, </a:t>
+              <a:t>A. Silberschatz, H.F. Korth &amp; S. Sudarshan, </a:t>
             </a:r>
             <a:r>
               <a:rPr lang="en-US" i="1" dirty="0"/>
@@ -4814,41 +4805,6 @@
           <a:p>
             <a:pPr algn="r" rtl="1"/>
             <a:endParaRPr lang="he-IL" dirty="0"/>
-          </a:p>
-          <a:p>
-            <a:pPr algn="r" rtl="1"/>
-            <a:r>
-              <a:rPr lang="he-IL" sz="1400" dirty="0"/>
-              <a:t>הערה אישית: ספר מצויין , שמכיל בתוכו כל מה שקשור ל </a:t>
-            </a:r>
-            <a:r>
-              <a:rPr lang="en-US" sz="1400" dirty="0" err="1"/>
-              <a:t>sql</a:t>
-            </a:r>
-            <a:r>
-              <a:rPr lang="en-US" sz="1400" dirty="0"/>
-              <a:t> </a:t>
-            </a:r>
-            <a:r>
-              <a:rPr lang="he-IL" sz="1400" dirty="0"/>
-              <a:t> ו </a:t>
-            </a:r>
-            <a:r>
-              <a:rPr lang="en-US" sz="1400" dirty="0"/>
-              <a:t> databases </a:t>
-            </a:r>
-            <a:r>
-              <a:rPr lang="he-IL" sz="1400" dirty="0"/>
-              <a:t> ספר שאפשר לקחת גם שמתחילים לעבוד.  </a:t>
-            </a:r>
-          </a:p>
-          <a:p>
-            <a:pPr algn="r" rtl="1"/>
-            <a:r>
-              <a:rPr lang="he-IL" sz="1400" dirty="0"/>
-              <a:t>לא לגעת בספר הקורס בעברית – לא מתרגמים משהו מצויין.</a:t>
-            </a:r>
-            <a:endParaRPr lang="en-US" sz="1400" dirty="0"/>
           </a:p>
         </p:txBody>
       </p:sp>
@@ -4862,6 +4818,13 @@
   <p:clrMapOvr>
     <a:masterClrMapping/>
   </p:clrMapOvr>
+  <p:timing>
+    <p:tnLst>
+      <p:par>
+        <p:cTn id="1" dur="indefinite" restart="never" nodeType="tmRoot"/>
+      </p:par>
+    </p:tnLst>
+  </p:timing>
 </p:sld>
 </file>
 
@@ -4927,12 +4890,12 @@
               <a:t>כל המידע איך לפתור את חלק זה </a:t>
             </a:r>
             <a:r>
-              <a:rPr lang="he-IL" dirty="0" err="1"/>
-              <a:t>במיבחן</a:t>
+              <a:rPr lang="he-IL" dirty="0" smtClean="0"/>
+              <a:t>במבחן </a:t>
             </a:r>
             <a:r>
               <a:rPr lang="he-IL" dirty="0"/>
-              <a:t> הוא מהאינטרנט ולא מספר הלימוד.</a:t>
+              <a:t>הוא מהאינטרנט ולא מספר הלימוד.</a:t>
             </a:r>
           </a:p>
           <a:p>
@@ -4971,6 +4934,18 @@
           </a:p>
           <a:p>
             <a:pPr algn="r" rtl="1"/>
+            <a:r>
+              <a:rPr lang="he-IL" dirty="0" smtClean="0"/>
+              <a:t>השעורים כאן הם </a:t>
+            </a:r>
+            <a:r>
+              <a:rPr lang="he-IL" dirty="0" err="1" smtClean="0"/>
+              <a:t>מוכווני</a:t>
+            </a:r>
+            <a:r>
+              <a:rPr lang="he-IL" dirty="0" smtClean="0"/>
+              <a:t> שאלות ממבחנים ולא על החומר עצמו שאפשר ללמוד גם מהספר וגם מאינטרנט</a:t>
+            </a:r>
             <a:endParaRPr lang="en-US" dirty="0"/>
           </a:p>
         </p:txBody>
@@ -4985,6 +4960,13 @@
   <p:clrMapOvr>
     <a:masterClrMapping/>
   </p:clrMapOvr>
+  <p:timing>
+    <p:tnLst>
+      <p:par>
+        <p:cTn id="1" dur="indefinite" restart="never" nodeType="tmRoot"/>
+      </p:par>
+    </p:tnLst>
+  </p:timing>
 </p:sld>
 </file>
 
@@ -5125,8 +5107,31 @@
                   <a:schemeClr val="accent2"/>
                 </a:solidFill>
               </a:rPr>
-              <a:t>transitivity rule.</a:t>
-            </a:r>
+              <a:t>transitivity rule</a:t>
+            </a:r>
+            <a:r>
+              <a:rPr lang="en-US" dirty="0" smtClean="0">
+                <a:solidFill>
+                  <a:schemeClr val="accent2"/>
+                </a:solidFill>
+              </a:rPr>
+              <a:t>.</a:t>
+            </a:r>
+            <a:endParaRPr lang="he-IL" dirty="0" smtClean="0">
+              <a:solidFill>
+                <a:schemeClr val="accent2"/>
+              </a:solidFill>
+            </a:endParaRPr>
+          </a:p>
+          <a:p>
+            <a:pPr marL="0" indent="0">
+              <a:buNone/>
+            </a:pPr>
+            <a:endParaRPr lang="en-US" dirty="0">
+              <a:solidFill>
+                <a:schemeClr val="accent2"/>
+              </a:solidFill>
+            </a:endParaRPr>
           </a:p>
         </p:txBody>
       </p:sp>
@@ -5140,6 +5145,13 @@
   <p:clrMapOvr>
     <a:masterClrMapping/>
   </p:clrMapOvr>
+  <p:timing>
+    <p:tnLst>
+      <p:par>
+        <p:cTn id="1" dur="indefinite" restart="never" nodeType="tmRoot"/>
+      </p:par>
+    </p:tnLst>
+  </p:timing>
 </p:sld>
 </file>
 
@@ -5275,6 +5287,13 @@
   <p:clrMapOvr>
     <a:masterClrMapping/>
   </p:clrMapOvr>
+  <p:timing>
+    <p:tnLst>
+      <p:par>
+        <p:cTn id="1" dur="indefinite" restart="never" nodeType="tmRoot"/>
+      </p:par>
+    </p:tnLst>
+  </p:timing>
 </p:sld>
 </file>
 

</xml_diff>